<commit_message>
Poke at pdf conversion once more
</commit_message>
<xml_diff>
--- a/public/slides/Module 1.2 Course Mechanics.pptx
+++ b/public/slides/Module 1.2 Course Mechanics.pptx
@@ -208,7 +208,7 @@
           <a:p>
             <a:fld id="{7C7E5181-6CF5-45F7-A87A-E0E0B1FD7549}" type="datetimeFigureOut">
               <a:rPr lang="en-US" smtClean="0"/>
-              <a:t>4/28/25</a:t>
+              <a:t>4/29/25</a:t>
             </a:fld>
             <a:endParaRPr lang="en-US"/>
           </a:p>
@@ -782,7 +782,7 @@
           <a:p>
             <a:fld id="{5D2A64DE-480B-420F-9649-4F8E696E08E0}" type="datetime1">
               <a:rPr lang="en-US" smtClean="0"/>
-              <a:t>4/28/25</a:t>
+              <a:t>4/29/25</a:t>
             </a:fld>
             <a:endParaRPr lang="en-US"/>
           </a:p>
@@ -1016,7 +1016,7 @@
           <a:p>
             <a:fld id="{0D3616D0-8311-4107-9726-6B805E7D05BA}" type="datetime1">
               <a:rPr lang="en-US" smtClean="0"/>
-              <a:t>4/28/25</a:t>
+              <a:t>4/29/25</a:t>
             </a:fld>
             <a:endParaRPr lang="en-US"/>
           </a:p>
@@ -1224,7 +1224,7 @@
           <a:p>
             <a:fld id="{3BC2557A-5C88-417A-A763-5AC779462A5F}" type="datetime1">
               <a:rPr lang="en-US" smtClean="0"/>
-              <a:t>4/28/25</a:t>
+              <a:t>4/29/25</a:t>
             </a:fld>
             <a:endParaRPr lang="en-US"/>
           </a:p>
@@ -1741,7 +1741,7 @@
           <a:p>
             <a:fld id="{07C7BFD4-467E-4EDE-93EA-052F5B39A4E5}" type="datetime1">
               <a:rPr lang="en-US" smtClean="0"/>
-              <a:t>4/28/25</a:t>
+              <a:t>4/29/25</a:t>
             </a:fld>
             <a:endParaRPr lang="en-US"/>
           </a:p>
@@ -2054,7 +2054,7 @@
           <a:p>
             <a:fld id="{A533CBE2-D5BE-47AC-ADC2-9CDFC1D0CF90}" type="datetime1">
               <a:rPr lang="en-US" smtClean="0"/>
-              <a:t>4/28/25</a:t>
+              <a:t>4/29/25</a:t>
             </a:fld>
             <a:endParaRPr lang="en-US"/>
           </a:p>
@@ -2355,7 +2355,7 @@
           <a:p>
             <a:fld id="{39B7EDB1-CE74-4951-85A2-0B01C2128E28}" type="datetime1">
               <a:rPr lang="en-US" smtClean="0"/>
-              <a:t>4/28/25</a:t>
+              <a:t>4/29/25</a:t>
             </a:fld>
             <a:endParaRPr lang="en-US"/>
           </a:p>
@@ -2803,7 +2803,7 @@
           <a:p>
             <a:fld id="{2BC7EB92-A5C2-4807-A9DC-9EDE6CBFB241}" type="datetime1">
               <a:rPr lang="en-US" smtClean="0"/>
-              <a:t>4/28/25</a:t>
+              <a:t>4/29/25</a:t>
             </a:fld>
             <a:endParaRPr lang="en-US"/>
           </a:p>
@@ -2949,7 +2949,7 @@
           <a:p>
             <a:fld id="{109E55A0-C911-4F03-82FC-7E5926047D46}" type="datetime1">
               <a:rPr lang="en-US" smtClean="0"/>
-              <a:t>4/28/25</a:t>
+              <a:t>4/29/25</a:t>
             </a:fld>
             <a:endParaRPr lang="en-US"/>
           </a:p>
@@ -3098,7 +3098,7 @@
           <a:p>
             <a:fld id="{2B7B7EE0-7771-4CD5-9B2B-3550753A54A1}" type="datetime1">
               <a:rPr lang="en-US" smtClean="0"/>
-              <a:t>4/28/25</a:t>
+              <a:t>4/29/25</a:t>
             </a:fld>
             <a:endParaRPr lang="en-US"/>
           </a:p>
@@ -3409,7 +3409,7 @@
           <a:p>
             <a:fld id="{F8B318B3-0E87-4416-A9B8-D891968C2727}" type="datetime1">
               <a:rPr lang="en-US" smtClean="0"/>
-              <a:t>4/28/25</a:t>
+              <a:t>4/29/25</a:t>
             </a:fld>
             <a:endParaRPr lang="en-US"/>
           </a:p>
@@ -3697,7 +3697,7 @@
           <a:p>
             <a:fld id="{EA476A42-A091-4468-A075-64A31BE59948}" type="datetime1">
               <a:rPr lang="en-US" smtClean="0"/>
-              <a:t>4/28/25</a:t>
+              <a:t>4/29/25</a:t>
             </a:fld>
             <a:endParaRPr lang="en-US"/>
           </a:p>
@@ -3938,7 +3938,7 @@
           <a:p>
             <a:fld id="{54D997E8-DDEE-43F1-8D9B-F8A1E11DE488}" type="datetime1">
               <a:rPr lang="en-US" smtClean="0"/>
-              <a:t>4/28/25</a:t>
+              <a:t>4/29/25</a:t>
             </a:fld>
             <a:endParaRPr lang="en-US"/>
           </a:p>

</xml_diff>

<commit_message>
Activites for first two days
</commit_message>
<xml_diff>
--- a/public/slides/Module 1.2 Course Mechanics.pptx
+++ b/public/slides/Module 1.2 Course Mechanics.pptx
@@ -208,7 +208,7 @@
           <a:p>
             <a:fld id="{7C7E5181-6CF5-45F7-A87A-E0E0B1FD7549}" type="datetimeFigureOut">
               <a:rPr lang="en-US" smtClean="0"/>
-              <a:t>4/28/25</a:t>
+              <a:t>4/29/25</a:t>
             </a:fld>
             <a:endParaRPr lang="en-US"/>
           </a:p>
@@ -782,7 +782,7 @@
           <a:p>
             <a:fld id="{5D2A64DE-480B-420F-9649-4F8E696E08E0}" type="datetime1">
               <a:rPr lang="en-US" smtClean="0"/>
-              <a:t>4/28/25</a:t>
+              <a:t>4/29/25</a:t>
             </a:fld>
             <a:endParaRPr lang="en-US"/>
           </a:p>
@@ -1016,7 +1016,7 @@
           <a:p>
             <a:fld id="{0D3616D0-8311-4107-9726-6B805E7D05BA}" type="datetime1">
               <a:rPr lang="en-US" smtClean="0"/>
-              <a:t>4/28/25</a:t>
+              <a:t>4/29/25</a:t>
             </a:fld>
             <a:endParaRPr lang="en-US"/>
           </a:p>
@@ -1224,7 +1224,7 @@
           <a:p>
             <a:fld id="{3BC2557A-5C88-417A-A763-5AC779462A5F}" type="datetime1">
               <a:rPr lang="en-US" smtClean="0"/>
-              <a:t>4/28/25</a:t>
+              <a:t>4/29/25</a:t>
             </a:fld>
             <a:endParaRPr lang="en-US"/>
           </a:p>
@@ -1741,7 +1741,7 @@
           <a:p>
             <a:fld id="{07C7BFD4-467E-4EDE-93EA-052F5B39A4E5}" type="datetime1">
               <a:rPr lang="en-US" smtClean="0"/>
-              <a:t>4/28/25</a:t>
+              <a:t>4/29/25</a:t>
             </a:fld>
             <a:endParaRPr lang="en-US"/>
           </a:p>
@@ -2054,7 +2054,7 @@
           <a:p>
             <a:fld id="{A533CBE2-D5BE-47AC-ADC2-9CDFC1D0CF90}" type="datetime1">
               <a:rPr lang="en-US" smtClean="0"/>
-              <a:t>4/28/25</a:t>
+              <a:t>4/29/25</a:t>
             </a:fld>
             <a:endParaRPr lang="en-US"/>
           </a:p>
@@ -2355,7 +2355,7 @@
           <a:p>
             <a:fld id="{39B7EDB1-CE74-4951-85A2-0B01C2128E28}" type="datetime1">
               <a:rPr lang="en-US" smtClean="0"/>
-              <a:t>4/28/25</a:t>
+              <a:t>4/29/25</a:t>
             </a:fld>
             <a:endParaRPr lang="en-US"/>
           </a:p>
@@ -2803,7 +2803,7 @@
           <a:p>
             <a:fld id="{2BC7EB92-A5C2-4807-A9DC-9EDE6CBFB241}" type="datetime1">
               <a:rPr lang="en-US" smtClean="0"/>
-              <a:t>4/28/25</a:t>
+              <a:t>4/29/25</a:t>
             </a:fld>
             <a:endParaRPr lang="en-US"/>
           </a:p>
@@ -2949,7 +2949,7 @@
           <a:p>
             <a:fld id="{109E55A0-C911-4F03-82FC-7E5926047D46}" type="datetime1">
               <a:rPr lang="en-US" smtClean="0"/>
-              <a:t>4/28/25</a:t>
+              <a:t>4/29/25</a:t>
             </a:fld>
             <a:endParaRPr lang="en-US"/>
           </a:p>
@@ -3098,7 +3098,7 @@
           <a:p>
             <a:fld id="{2B7B7EE0-7771-4CD5-9B2B-3550753A54A1}" type="datetime1">
               <a:rPr lang="en-US" smtClean="0"/>
-              <a:t>4/28/25</a:t>
+              <a:t>4/29/25</a:t>
             </a:fld>
             <a:endParaRPr lang="en-US"/>
           </a:p>
@@ -3409,7 +3409,7 @@
           <a:p>
             <a:fld id="{F8B318B3-0E87-4416-A9B8-D891968C2727}" type="datetime1">
               <a:rPr lang="en-US" smtClean="0"/>
-              <a:t>4/28/25</a:t>
+              <a:t>4/29/25</a:t>
             </a:fld>
             <a:endParaRPr lang="en-US"/>
           </a:p>
@@ -3697,7 +3697,7 @@
           <a:p>
             <a:fld id="{EA476A42-A091-4468-A075-64A31BE59948}" type="datetime1">
               <a:rPr lang="en-US" smtClean="0"/>
-              <a:t>4/28/25</a:t>
+              <a:t>4/29/25</a:t>
             </a:fld>
             <a:endParaRPr lang="en-US"/>
           </a:p>
@@ -3938,7 +3938,7 @@
           <a:p>
             <a:fld id="{54D997E8-DDEE-43F1-8D9B-F8A1E11DE488}" type="datetime1">
               <a:rPr lang="en-US" smtClean="0"/>
-              <a:t>4/28/25</a:t>
+              <a:t>4/29/25</a:t>
             </a:fld>
             <a:endParaRPr lang="en-US"/>
           </a:p>
@@ -4446,23 +4446,35 @@
           <a:lstStyle/>
           <a:p>
             <a:r>
+              <a:rPr lang="en-US" altLang="en-US" sz="3200" dirty="0">
+                <a:sym typeface="Helvetica Neue" charset="0"/>
+              </a:rPr>
+              <a:t>CS 4530: Fundamentals of Software Engineering</a:t>
+            </a:r>
+            <a:br>
+              <a:rPr lang="en-US" altLang="en-US" sz="3200" dirty="0">
+                <a:sym typeface="Helvetica Neue" charset="0"/>
+              </a:rPr>
+            </a:br>
+            <a:r>
+              <a:rPr lang="en-US" altLang="en-US" sz="3200" dirty="0">
+                <a:sym typeface="Helvetica Neue" charset="0"/>
+              </a:rPr>
+              <a:t>Module 1</a:t>
+            </a:r>
+            <a:r>
               <a:rPr lang="en-US" altLang="en-US" sz="3200">
                 <a:sym typeface="Helvetica Neue" charset="0"/>
               </a:rPr>
-              <a:t>CS 4530: Fundamentals of Software Engineering</a:t>
-            </a:r>
-            <a:br>
-              <a:rPr lang="en-US" altLang="en-US" sz="3200">
+              <a:t>, lesson 2 — </a:t>
+            </a:r>
+            <a:r>
+              <a:rPr lang="en-US" altLang="en-US" sz="3200" dirty="0">
                 <a:sym typeface="Helvetica Neue" charset="0"/>
               </a:rPr>
-            </a:br>
-            <a:r>
-              <a:rPr lang="en-US" altLang="en-US" sz="3200">
-                <a:sym typeface="Helvetica Neue" charset="0"/>
-              </a:rPr>
-              <a:t>Module 1.2 Course Mechanics</a:t>
-            </a:r>
-            <a:endParaRPr lang="en-US" sz="3200"/>
+              <a:t>Course Mechanics</a:t>
+            </a:r>
+            <a:endParaRPr lang="en-US" sz="3200" dirty="0"/>
           </a:p>
         </p:txBody>
       </p:sp>

</xml_diff>